<commit_message>
ASP.NET 5 - TalkShow -  Make demo
</commit_message>
<xml_diff>
--- a/FilterOverride/asp-netmvcfilters-111228092902-phpapp02.pptx
+++ b/FilterOverride/asp-netmvcfilters-111228092902-phpapp02.pptx
@@ -5,37 +5,38 @@
     <p:sldMasterId id="2147483650" r:id="rId1"/>
   </p:sldMasterIdLst>
   <p:notesMasterIdLst>
-    <p:notesMasterId r:id="rId27"/>
+    <p:notesMasterId r:id="rId28"/>
   </p:notesMasterIdLst>
   <p:handoutMasterIdLst>
-    <p:handoutMasterId r:id="rId28"/>
+    <p:handoutMasterId r:id="rId29"/>
   </p:handoutMasterIdLst>
   <p:sldIdLst>
     <p:sldId id="256" r:id="rId2"/>
     <p:sldId id="267" r:id="rId3"/>
     <p:sldId id="285" r:id="rId4"/>
     <p:sldId id="314" r:id="rId5"/>
-    <p:sldId id="357" r:id="rId6"/>
-    <p:sldId id="290" r:id="rId7"/>
-    <p:sldId id="284" r:id="rId8"/>
-    <p:sldId id="376" r:id="rId9"/>
-    <p:sldId id="286" r:id="rId10"/>
-    <p:sldId id="371" r:id="rId11"/>
-    <p:sldId id="372" r:id="rId12"/>
-    <p:sldId id="374" r:id="rId13"/>
-    <p:sldId id="287" r:id="rId14"/>
-    <p:sldId id="288" r:id="rId15"/>
-    <p:sldId id="375" r:id="rId16"/>
-    <p:sldId id="289" r:id="rId17"/>
-    <p:sldId id="358" r:id="rId18"/>
-    <p:sldId id="373" r:id="rId19"/>
-    <p:sldId id="292" r:id="rId20"/>
-    <p:sldId id="361" r:id="rId21"/>
-    <p:sldId id="293" r:id="rId22"/>
-    <p:sldId id="370" r:id="rId23"/>
-    <p:sldId id="294" r:id="rId24"/>
-    <p:sldId id="295" r:id="rId25"/>
-    <p:sldId id="296" r:id="rId26"/>
+    <p:sldId id="377" r:id="rId6"/>
+    <p:sldId id="357" r:id="rId7"/>
+    <p:sldId id="290" r:id="rId8"/>
+    <p:sldId id="284" r:id="rId9"/>
+    <p:sldId id="376" r:id="rId10"/>
+    <p:sldId id="286" r:id="rId11"/>
+    <p:sldId id="371" r:id="rId12"/>
+    <p:sldId id="372" r:id="rId13"/>
+    <p:sldId id="374" r:id="rId14"/>
+    <p:sldId id="287" r:id="rId15"/>
+    <p:sldId id="288" r:id="rId16"/>
+    <p:sldId id="375" r:id="rId17"/>
+    <p:sldId id="289" r:id="rId18"/>
+    <p:sldId id="358" r:id="rId19"/>
+    <p:sldId id="373" r:id="rId20"/>
+    <p:sldId id="292" r:id="rId21"/>
+    <p:sldId id="361" r:id="rId22"/>
+    <p:sldId id="293" r:id="rId23"/>
+    <p:sldId id="370" r:id="rId24"/>
+    <p:sldId id="294" r:id="rId25"/>
+    <p:sldId id="295" r:id="rId26"/>
+    <p:sldId id="296" r:id="rId27"/>
   </p:sldIdLst>
   <p:sldSz cx="9144000" cy="6858000" type="screen4x3"/>
   <p:notesSz cx="6858000" cy="9144000"/>
@@ -177,6 +178,7 @@
           <p14:sldIdLst>
             <p14:sldId id="285"/>
             <p14:sldId id="314"/>
+            <p14:sldId id="377"/>
             <p14:sldId id="357"/>
             <p14:sldId id="290"/>
             <p14:sldId id="284"/>
@@ -4366,6 +4368,196 @@
           <a:lstStyle/>
           <a:p>
             <a:r>
+              <a:rPr lang="en-US" dirty="0"/>
+              <a:t> </a:t>
+            </a:r>
+            <a:r>
+              <a:rPr lang="en-US" dirty="0" err="1"/>
+              <a:t>IAuthorizationFilter</a:t>
+            </a:r>
+            <a:endParaRPr lang="en-US" dirty="0"/>
+          </a:p>
+        </p:txBody>
+      </p:sp>
+      <p:sp>
+        <p:nvSpPr>
+          <p:cNvPr id="3" name="Content Placeholder 2"/>
+          <p:cNvSpPr>
+            <a:spLocks noGrp="1"/>
+          </p:cNvSpPr>
+          <p:nvPr>
+            <p:ph idx="1"/>
+          </p:nvPr>
+        </p:nvSpPr>
+        <p:spPr>
+          <a:xfrm>
+            <a:off x="304800" y="1416050"/>
+            <a:ext cx="8655050" cy="3010055"/>
+          </a:xfrm>
+        </p:spPr>
+        <p:txBody>
+          <a:bodyPr/>
+          <a:lstStyle/>
+          <a:p>
+            <a:r>
+              <a:rPr lang="en-US" dirty="0" smtClean="0"/>
+              <a:t>Make </a:t>
+            </a:r>
+            <a:r>
+              <a:rPr lang="en-US" dirty="0"/>
+              <a:t>security decisions about whether to execute an action </a:t>
+            </a:r>
+            <a:r>
+              <a:rPr lang="en-US" dirty="0" smtClean="0"/>
+              <a:t>method.</a:t>
+            </a:r>
+          </a:p>
+          <a:p>
+            <a:pPr lvl="1">
+              <a:lnSpc>
+                <a:spcPct val="150000"/>
+              </a:lnSpc>
+            </a:pPr>
+            <a:r>
+              <a:rPr lang="en-US" dirty="0" err="1" smtClean="0"/>
+              <a:t>AuthorizeAttribute</a:t>
+            </a:r>
+            <a:endParaRPr lang="en-US" dirty="0"/>
+          </a:p>
+          <a:p>
+            <a:pPr lvl="1">
+              <a:lnSpc>
+                <a:spcPct val="150000"/>
+              </a:lnSpc>
+            </a:pPr>
+            <a:r>
+              <a:rPr lang="en-US" dirty="0" err="1" smtClean="0"/>
+              <a:t>RequireHttpsAttribute</a:t>
+            </a:r>
+            <a:endParaRPr lang="en-US" dirty="0"/>
+          </a:p>
+          <a:p>
+            <a:endParaRPr lang="en-US" dirty="0"/>
+          </a:p>
+          <a:p>
+            <a:endParaRPr lang="en-US" dirty="0"/>
+          </a:p>
+        </p:txBody>
+      </p:sp>
+      <p:pic>
+        <p:nvPicPr>
+          <p:cNvPr id="3074" name="Picture 2"/>
+          <p:cNvPicPr>
+            <a:picLocks noChangeAspect="1" noChangeArrowheads="1"/>
+          </p:cNvPicPr>
+          <p:nvPr/>
+        </p:nvPicPr>
+        <p:blipFill>
+          <a:blip r:embed="rId2">
+            <a:extLst>
+              <a:ext uri="{28A0092B-C50C-407E-A947-70E740481C1C}">
+                <a14:useLocalDpi xmlns:a14="http://schemas.microsoft.com/office/drawing/2010/main" val="0"/>
+              </a:ext>
+            </a:extLst>
+          </a:blip>
+          <a:srcRect/>
+          <a:stretch>
+            <a:fillRect/>
+          </a:stretch>
+        </p:blipFill>
+        <p:spPr bwMode="auto">
+          <a:xfrm>
+            <a:off x="1750695" y="3718560"/>
+            <a:ext cx="5637774" cy="1855470"/>
+          </a:xfrm>
+          <a:prstGeom prst="roundRect">
+            <a:avLst>
+              <a:gd name="adj" fmla="val 8594"/>
+            </a:avLst>
+          </a:prstGeom>
+          <a:solidFill>
+            <a:srgbClr val="FFFFFF">
+              <a:shade val="85000"/>
+            </a:srgbClr>
+          </a:solidFill>
+          <a:ln>
+            <a:noFill/>
+          </a:ln>
+          <a:effectLst>
+            <a:outerShdw dist="35921" dir="2700000" sx="1000" sy="1000" algn="ctr" rotWithShape="0">
+              <a:schemeClr val="bg2"/>
+            </a:outerShdw>
+          </a:effectLst>
+          <a:extLst>
+            <a:ext uri="{91240B29-F687-4F45-9708-019B960494DF}">
+              <a14:hiddenLine xmlns:a14="http://schemas.microsoft.com/office/drawing/2010/main" w="9525">
+                <a:solidFill>
+                  <a:schemeClr val="tx1"/>
+                </a:solidFill>
+                <a:miter lim="800000"/>
+                <a:headEnd/>
+                <a:tailEnd/>
+              </a14:hiddenLine>
+            </a:ext>
+          </a:extLst>
+        </p:spPr>
+      </p:pic>
+    </p:spTree>
+    <p:extLst>
+      <p:ext uri="{BB962C8B-B14F-4D97-AF65-F5344CB8AC3E}">
+        <p14:creationId xmlns:p14="http://schemas.microsoft.com/office/powerpoint/2010/main" val="549084641"/>
+      </p:ext>
+    </p:extLst>
+  </p:cSld>
+  <p:clrMapOvr>
+    <a:masterClrMapping/>
+  </p:clrMapOvr>
+  <p:transition>
+    <p:strips dir="rd"/>
+  </p:transition>
+  <p:timing>
+    <p:tnLst>
+      <p:par>
+        <p:cTn id="1" dur="indefinite" restart="never" nodeType="tmRoot"/>
+      </p:par>
+    </p:tnLst>
+  </p:timing>
+</p:sld>
+</file>
+
+<file path=ppt/slides/slide11.xml><?xml version="1.0" encoding="utf-8"?>
+<p:sld xmlns:a="http://schemas.openxmlformats.org/drawingml/2006/main" xmlns:r="http://schemas.openxmlformats.org/officeDocument/2006/relationships" xmlns:p="http://schemas.openxmlformats.org/presentationml/2006/main">
+  <p:cSld>
+    <p:spTree>
+      <p:nvGrpSpPr>
+        <p:cNvPr id="1" name=""/>
+        <p:cNvGrpSpPr/>
+        <p:nvPr/>
+      </p:nvGrpSpPr>
+      <p:grpSpPr>
+        <a:xfrm>
+          <a:off x="0" y="0"/>
+          <a:ext cx="0" cy="0"/>
+          <a:chOff x="0" y="0"/>
+          <a:chExt cx="0" cy="0"/>
+        </a:xfrm>
+      </p:grpSpPr>
+      <p:sp>
+        <p:nvSpPr>
+          <p:cNvPr id="2" name="Title 1"/>
+          <p:cNvSpPr>
+            <a:spLocks noGrp="1"/>
+          </p:cNvSpPr>
+          <p:nvPr>
+            <p:ph type="title"/>
+          </p:nvPr>
+        </p:nvSpPr>
+        <p:spPr/>
+        <p:txBody>
+          <a:bodyPr/>
+          <a:lstStyle/>
+          <a:p>
+            <a:r>
               <a:rPr lang="en-US" dirty="0" smtClean="0"/>
               <a:t>Authorize Attribute Sample</a:t>
             </a:r>
@@ -4913,7 +5105,7 @@
 </p:sld>
 </file>
 
-<file path=ppt/slides/slide11.xml><?xml version="1.0" encoding="utf-8"?>
+<file path=ppt/slides/slide12.xml><?xml version="1.0" encoding="utf-8"?>
 <p:sld xmlns:a="http://schemas.openxmlformats.org/drawingml/2006/main" xmlns:r="http://schemas.openxmlformats.org/officeDocument/2006/relationships" xmlns:p="http://schemas.openxmlformats.org/presentationml/2006/main">
   <p:cSld>
     <p:spTree>
@@ -5320,7 +5512,7 @@
 </p:sld>
 </file>
 
-<file path=ppt/slides/slide12.xml><?xml version="1.0" encoding="utf-8"?>
+<file path=ppt/slides/slide13.xml><?xml version="1.0" encoding="utf-8"?>
 <p:sld xmlns:a="http://schemas.openxmlformats.org/drawingml/2006/main" xmlns:r="http://schemas.openxmlformats.org/officeDocument/2006/relationships" xmlns:p="http://schemas.openxmlformats.org/presentationml/2006/main">
   <p:cSld>
     <p:spTree>
@@ -5538,7 +5730,7 @@
 </p:sld>
 </file>
 
-<file path=ppt/slides/slide13.xml><?xml version="1.0" encoding="utf-8"?>
+<file path=ppt/slides/slide14.xml><?xml version="1.0" encoding="utf-8"?>
 <p:sld xmlns:a="http://schemas.openxmlformats.org/drawingml/2006/main" xmlns:r="http://schemas.openxmlformats.org/officeDocument/2006/relationships" xmlns:p="http://schemas.openxmlformats.org/presentationml/2006/main">
   <p:cSld>
     <p:spTree>
@@ -5804,7 +5996,7 @@
 </p:sld>
 </file>
 
-<file path=ppt/slides/slide14.xml><?xml version="1.0" encoding="utf-8"?>
+<file path=ppt/slides/slide15.xml><?xml version="1.0" encoding="utf-8"?>
 <p:sld xmlns:a="http://schemas.openxmlformats.org/drawingml/2006/main" xmlns:r="http://schemas.openxmlformats.org/officeDocument/2006/relationships" xmlns:p="http://schemas.openxmlformats.org/presentationml/2006/main">
   <p:cSld>
     <p:spTree>
@@ -6084,7 +6276,7 @@
 </p:sld>
 </file>
 
-<file path=ppt/slides/slide15.xml><?xml version="1.0" encoding="utf-8"?>
+<file path=ppt/slides/slide16.xml><?xml version="1.0" encoding="utf-8"?>
 <p:sld xmlns:a="http://schemas.openxmlformats.org/drawingml/2006/main" xmlns:r="http://schemas.openxmlformats.org/officeDocument/2006/relationships" xmlns:p="http://schemas.openxmlformats.org/presentationml/2006/main">
   <p:cSld>
     <p:spTree>
@@ -6350,7 +6542,7 @@
 </p:sld>
 </file>
 
-<file path=ppt/slides/slide16.xml><?xml version="1.0" encoding="utf-8"?>
+<file path=ppt/slides/slide17.xml><?xml version="1.0" encoding="utf-8"?>
 <p:sld xmlns:a="http://schemas.openxmlformats.org/drawingml/2006/main" xmlns:r="http://schemas.openxmlformats.org/officeDocument/2006/relationships" xmlns:p="http://schemas.openxmlformats.org/presentationml/2006/main">
   <p:cSld>
     <p:spTree>
@@ -6638,7 +6830,7 @@
 </p:sld>
 </file>
 
-<file path=ppt/slides/slide17.xml><?xml version="1.0" encoding="utf-8"?>
+<file path=ppt/slides/slide18.xml><?xml version="1.0" encoding="utf-8"?>
 <p:sld xmlns:a="http://schemas.openxmlformats.org/drawingml/2006/main" xmlns:r="http://schemas.openxmlformats.org/officeDocument/2006/relationships" xmlns:p="http://schemas.openxmlformats.org/presentationml/2006/main">
   <p:cSld>
     <p:spTree>
@@ -6984,7 +7176,7 @@
 </p:sld>
 </file>
 
-<file path=ppt/slides/slide18.xml><?xml version="1.0" encoding="utf-8"?>
+<file path=ppt/slides/slide19.xml><?xml version="1.0" encoding="utf-8"?>
 <p:sld xmlns:a="http://schemas.openxmlformats.org/drawingml/2006/main" xmlns:r="http://schemas.openxmlformats.org/officeDocument/2006/relationships" xmlns:p="http://schemas.openxmlformats.org/presentationml/2006/main">
   <p:cSld>
     <p:spTree>
@@ -7728,7 +7920,149 @@
 </p:sld>
 </file>
 
-<file path=ppt/slides/slide19.xml><?xml version="1.0" encoding="utf-8"?>
+<file path=ppt/slides/slide2.xml><?xml version="1.0" encoding="utf-8"?>
+<p:sld xmlns:a="http://schemas.openxmlformats.org/drawingml/2006/main" xmlns:r="http://schemas.openxmlformats.org/officeDocument/2006/relationships" xmlns:p="http://schemas.openxmlformats.org/presentationml/2006/main">
+  <p:cSld>
+    <p:spTree>
+      <p:nvGrpSpPr>
+        <p:cNvPr id="1" name=""/>
+        <p:cNvGrpSpPr/>
+        <p:nvPr/>
+      </p:nvGrpSpPr>
+      <p:grpSpPr>
+        <a:xfrm>
+          <a:off x="0" y="0"/>
+          <a:ext cx="0" cy="0"/>
+          <a:chOff x="0" y="0"/>
+          <a:chExt cx="0" cy="0"/>
+        </a:xfrm>
+      </p:grpSpPr>
+      <p:sp>
+        <p:nvSpPr>
+          <p:cNvPr id="107522" name="Rectangle 2"/>
+          <p:cNvSpPr>
+            <a:spLocks noGrp="1" noChangeArrowheads="1"/>
+          </p:cNvSpPr>
+          <p:nvPr>
+            <p:ph type="title"/>
+          </p:nvPr>
+        </p:nvSpPr>
+        <p:spPr/>
+        <p:txBody>
+          <a:bodyPr/>
+          <a:lstStyle/>
+          <a:p>
+            <a:pPr eaLnBrk="1" hangingPunct="1">
+              <a:defRPr/>
+            </a:pPr>
+            <a:r>
+              <a:rPr lang="en-US" smtClean="0"/>
+              <a:t>Agenda</a:t>
+            </a:r>
+          </a:p>
+        </p:txBody>
+      </p:sp>
+      <p:sp>
+        <p:nvSpPr>
+          <p:cNvPr id="107523" name="Rectangle 3"/>
+          <p:cNvSpPr>
+            <a:spLocks noGrp="1" noChangeArrowheads="1"/>
+          </p:cNvSpPr>
+          <p:nvPr>
+            <p:ph type="body" idx="1"/>
+          </p:nvPr>
+        </p:nvSpPr>
+        <p:spPr>
+          <a:xfrm>
+            <a:off x="304800" y="1416050"/>
+            <a:ext cx="8655050" cy="3841052"/>
+          </a:xfrm>
+        </p:spPr>
+        <p:txBody>
+          <a:bodyPr/>
+          <a:lstStyle/>
+          <a:p>
+            <a:pPr eaLnBrk="1" hangingPunct="1">
+              <a:lnSpc>
+                <a:spcPct val="150000"/>
+              </a:lnSpc>
+              <a:defRPr/>
+            </a:pPr>
+            <a:r>
+              <a:rPr lang="en-US" dirty="0" smtClean="0"/>
+              <a:t>What is Filters?</a:t>
+            </a:r>
+          </a:p>
+          <a:p>
+            <a:pPr eaLnBrk="1" hangingPunct="1">
+              <a:lnSpc>
+                <a:spcPct val="150000"/>
+              </a:lnSpc>
+              <a:defRPr/>
+            </a:pPr>
+            <a:r>
+              <a:rPr lang="en-US" dirty="0" smtClean="0"/>
+              <a:t>Built-in Filters</a:t>
+            </a:r>
+          </a:p>
+          <a:p>
+            <a:pPr eaLnBrk="1" hangingPunct="1">
+              <a:lnSpc>
+                <a:spcPct val="150000"/>
+              </a:lnSpc>
+              <a:defRPr/>
+            </a:pPr>
+            <a:r>
+              <a:rPr lang="en-US" dirty="0" smtClean="0"/>
+              <a:t>Filter Interfaces</a:t>
+            </a:r>
+          </a:p>
+          <a:p>
+            <a:pPr eaLnBrk="1" hangingPunct="1">
+              <a:lnSpc>
+                <a:spcPct val="150000"/>
+              </a:lnSpc>
+              <a:defRPr/>
+            </a:pPr>
+            <a:r>
+              <a:rPr lang="en-US" dirty="0" smtClean="0"/>
+              <a:t>Custom Filters</a:t>
+            </a:r>
+          </a:p>
+          <a:p>
+            <a:pPr eaLnBrk="1" hangingPunct="1">
+              <a:lnSpc>
+                <a:spcPct val="150000"/>
+              </a:lnSpc>
+              <a:defRPr/>
+            </a:pPr>
+            <a:r>
+              <a:rPr lang="en-US" dirty="0" smtClean="0"/>
+              <a:t>Filter Providers</a:t>
+            </a:r>
+            <a:endParaRPr lang="he-IL" dirty="0" smtClean="0"/>
+          </a:p>
+        </p:txBody>
+      </p:sp>
+    </p:spTree>
+  </p:cSld>
+  <p:clrMapOvr>
+    <a:masterClrMapping/>
+  </p:clrMapOvr>
+  <p:transition>
+    <p:strips dir="rd"/>
+  </p:transition>
+  <p:timing>
+    <p:tnLst>
+      <p:par>
+        <p:cTn id="1" dur="indefinite" restart="never" nodeType="tmRoot"/>
+      </p:par>
+    </p:tnLst>
+  </p:timing>
+</p:sld>
+</file>
+
+<file path=ppt/slides/slide20.xml><?xml version="1.0" encoding="utf-8"?>
 <p:sld xmlns:a="http://schemas.openxmlformats.org/drawingml/2006/main" xmlns:r="http://schemas.openxmlformats.org/officeDocument/2006/relationships" xmlns:p="http://schemas.openxmlformats.org/presentationml/2006/main">
   <p:cSld>
     <p:spTree>
@@ -8082,149 +8416,7 @@
 </p:sld>
 </file>
 
-<file path=ppt/slides/slide2.xml><?xml version="1.0" encoding="utf-8"?>
-<p:sld xmlns:a="http://schemas.openxmlformats.org/drawingml/2006/main" xmlns:r="http://schemas.openxmlformats.org/officeDocument/2006/relationships" xmlns:p="http://schemas.openxmlformats.org/presentationml/2006/main">
-  <p:cSld>
-    <p:spTree>
-      <p:nvGrpSpPr>
-        <p:cNvPr id="1" name=""/>
-        <p:cNvGrpSpPr/>
-        <p:nvPr/>
-      </p:nvGrpSpPr>
-      <p:grpSpPr>
-        <a:xfrm>
-          <a:off x="0" y="0"/>
-          <a:ext cx="0" cy="0"/>
-          <a:chOff x="0" y="0"/>
-          <a:chExt cx="0" cy="0"/>
-        </a:xfrm>
-      </p:grpSpPr>
-      <p:sp>
-        <p:nvSpPr>
-          <p:cNvPr id="107522" name="Rectangle 2"/>
-          <p:cNvSpPr>
-            <a:spLocks noGrp="1" noChangeArrowheads="1"/>
-          </p:cNvSpPr>
-          <p:nvPr>
-            <p:ph type="title"/>
-          </p:nvPr>
-        </p:nvSpPr>
-        <p:spPr/>
-        <p:txBody>
-          <a:bodyPr/>
-          <a:lstStyle/>
-          <a:p>
-            <a:pPr eaLnBrk="1" hangingPunct="1">
-              <a:defRPr/>
-            </a:pPr>
-            <a:r>
-              <a:rPr lang="en-US" smtClean="0"/>
-              <a:t>Agenda</a:t>
-            </a:r>
-          </a:p>
-        </p:txBody>
-      </p:sp>
-      <p:sp>
-        <p:nvSpPr>
-          <p:cNvPr id="107523" name="Rectangle 3"/>
-          <p:cNvSpPr>
-            <a:spLocks noGrp="1" noChangeArrowheads="1"/>
-          </p:cNvSpPr>
-          <p:nvPr>
-            <p:ph type="body" idx="1"/>
-          </p:nvPr>
-        </p:nvSpPr>
-        <p:spPr>
-          <a:xfrm>
-            <a:off x="304800" y="1416050"/>
-            <a:ext cx="8655050" cy="3841052"/>
-          </a:xfrm>
-        </p:spPr>
-        <p:txBody>
-          <a:bodyPr/>
-          <a:lstStyle/>
-          <a:p>
-            <a:pPr eaLnBrk="1" hangingPunct="1">
-              <a:lnSpc>
-                <a:spcPct val="150000"/>
-              </a:lnSpc>
-              <a:defRPr/>
-            </a:pPr>
-            <a:r>
-              <a:rPr lang="en-US" dirty="0" smtClean="0"/>
-              <a:t>What is Filters?</a:t>
-            </a:r>
-          </a:p>
-          <a:p>
-            <a:pPr eaLnBrk="1" hangingPunct="1">
-              <a:lnSpc>
-                <a:spcPct val="150000"/>
-              </a:lnSpc>
-              <a:defRPr/>
-            </a:pPr>
-            <a:r>
-              <a:rPr lang="en-US" dirty="0" smtClean="0"/>
-              <a:t>Built-in Filters</a:t>
-            </a:r>
-          </a:p>
-          <a:p>
-            <a:pPr eaLnBrk="1" hangingPunct="1">
-              <a:lnSpc>
-                <a:spcPct val="150000"/>
-              </a:lnSpc>
-              <a:defRPr/>
-            </a:pPr>
-            <a:r>
-              <a:rPr lang="en-US" dirty="0" smtClean="0"/>
-              <a:t>Filter Interfaces</a:t>
-            </a:r>
-          </a:p>
-          <a:p>
-            <a:pPr eaLnBrk="1" hangingPunct="1">
-              <a:lnSpc>
-                <a:spcPct val="150000"/>
-              </a:lnSpc>
-              <a:defRPr/>
-            </a:pPr>
-            <a:r>
-              <a:rPr lang="en-US" dirty="0" smtClean="0"/>
-              <a:t>Custom Filters</a:t>
-            </a:r>
-          </a:p>
-          <a:p>
-            <a:pPr eaLnBrk="1" hangingPunct="1">
-              <a:lnSpc>
-                <a:spcPct val="150000"/>
-              </a:lnSpc>
-              <a:defRPr/>
-            </a:pPr>
-            <a:r>
-              <a:rPr lang="en-US" dirty="0" smtClean="0"/>
-              <a:t>Filter Providers</a:t>
-            </a:r>
-            <a:endParaRPr lang="he-IL" dirty="0" smtClean="0"/>
-          </a:p>
-        </p:txBody>
-      </p:sp>
-    </p:spTree>
-  </p:cSld>
-  <p:clrMapOvr>
-    <a:masterClrMapping/>
-  </p:clrMapOvr>
-  <p:transition>
-    <p:strips dir="rd"/>
-  </p:transition>
-  <p:timing>
-    <p:tnLst>
-      <p:par>
-        <p:cTn id="1" dur="indefinite" restart="never" nodeType="tmRoot"/>
-      </p:par>
-    </p:tnLst>
-  </p:timing>
-</p:sld>
-</file>
-
-<file path=ppt/slides/slide20.xml><?xml version="1.0" encoding="utf-8"?>
+<file path=ppt/slides/slide21.xml><?xml version="1.0" encoding="utf-8"?>
 <p:sld xmlns:a="http://schemas.openxmlformats.org/drawingml/2006/main" xmlns:r="http://schemas.openxmlformats.org/officeDocument/2006/relationships" xmlns:p="http://schemas.openxmlformats.org/presentationml/2006/main">
   <p:cSld>
     <p:spTree>
@@ -13691,7 +13883,7 @@
 </p:sld>
 </file>
 
-<file path=ppt/slides/slide21.xml><?xml version="1.0" encoding="utf-8"?>
+<file path=ppt/slides/slide22.xml><?xml version="1.0" encoding="utf-8"?>
 <p:sld xmlns:a="http://schemas.openxmlformats.org/drawingml/2006/main" xmlns:r="http://schemas.openxmlformats.org/officeDocument/2006/relationships" xmlns:p="http://schemas.openxmlformats.org/presentationml/2006/main">
   <p:cSld>
     <p:spTree>
@@ -13930,7 +14122,7 @@
 </p:sld>
 </file>
 
-<file path=ppt/slides/slide22.xml><?xml version="1.0" encoding="utf-8"?>
+<file path=ppt/slides/slide23.xml><?xml version="1.0" encoding="utf-8"?>
 <p:sld xmlns:a="http://schemas.openxmlformats.org/drawingml/2006/main" xmlns:r="http://schemas.openxmlformats.org/officeDocument/2006/relationships" xmlns:p="http://schemas.openxmlformats.org/presentationml/2006/main">
   <p:cSld>
     <p:spTree>
@@ -14197,7 +14389,7 @@
 </p:sld>
 </file>
 
-<file path=ppt/slides/slide23.xml><?xml version="1.0" encoding="utf-8"?>
+<file path=ppt/slides/slide24.xml><?xml version="1.0" encoding="utf-8"?>
 <p:sld xmlns:a="http://schemas.openxmlformats.org/drawingml/2006/main" xmlns:r="http://schemas.openxmlformats.org/officeDocument/2006/relationships" xmlns:p="http://schemas.openxmlformats.org/presentationml/2006/main">
   <p:cSld>
     <p:spTree>
@@ -14493,7 +14685,7 @@
 </p:sld>
 </file>
 
-<file path=ppt/slides/slide24.xml><?xml version="1.0" encoding="utf-8"?>
+<file path=ppt/slides/slide25.xml><?xml version="1.0" encoding="utf-8"?>
 <p:sld xmlns:a="http://schemas.openxmlformats.org/drawingml/2006/main" xmlns:r="http://schemas.openxmlformats.org/officeDocument/2006/relationships" xmlns:p="http://schemas.openxmlformats.org/presentationml/2006/main">
   <p:cSld>
     <p:spTree>
@@ -14638,7 +14830,7 @@
 </p:sld>
 </file>
 
-<file path=ppt/slides/slide25.xml><?xml version="1.0" encoding="utf-8"?>
+<file path=ppt/slides/slide26.xml><?xml version="1.0" encoding="utf-8"?>
 <p:sld xmlns:a="http://schemas.openxmlformats.org/drawingml/2006/main" xmlns:r="http://schemas.openxmlformats.org/officeDocument/2006/relationships" xmlns:p="http://schemas.openxmlformats.org/presentationml/2006/main">
   <p:cSld>
     <p:spTree>
@@ -16780,6 +16972,118 @@
       </p:grpSpPr>
       <p:sp>
         <p:nvSpPr>
+          <p:cNvPr id="2" name="Title 1"/>
+          <p:cNvSpPr>
+            <a:spLocks noGrp="1"/>
+          </p:cNvSpPr>
+          <p:nvPr>
+            <p:ph type="title"/>
+          </p:nvPr>
+        </p:nvSpPr>
+        <p:spPr/>
+        <p:txBody>
+          <a:bodyPr/>
+          <a:lstStyle/>
+          <a:p>
+            <a:endParaRPr lang="en-US"/>
+          </a:p>
+        </p:txBody>
+      </p:sp>
+      <p:sp>
+        <p:nvSpPr>
+          <p:cNvPr id="3" name="Content Placeholder 2"/>
+          <p:cNvSpPr>
+            <a:spLocks noGrp="1"/>
+          </p:cNvSpPr>
+          <p:nvPr>
+            <p:ph idx="1"/>
+          </p:nvPr>
+        </p:nvSpPr>
+        <p:spPr/>
+        <p:txBody>
+          <a:bodyPr/>
+          <a:lstStyle/>
+          <a:p>
+            <a:endParaRPr lang="en-US"/>
+          </a:p>
+        </p:txBody>
+      </p:sp>
+      <p:pic>
+        <p:nvPicPr>
+          <p:cNvPr id="1026" name="Picture 2" descr="https://lh6.googleusercontent.com/GdLHIQtOLuOL-tqwGSdLGJmHauj5uHSy3UwR8vml_6IymNmkutADmikSZx_vEFFnTgDcE9vmyPLvRqx1Oz_KWUuxoaRyjfrqwayIerTwZMEzpRPwpP5MTWafPq5z7HerCLJZOYJGCA"/>
+          <p:cNvPicPr>
+            <a:picLocks noChangeAspect="1" noChangeArrowheads="1"/>
+          </p:cNvPicPr>
+          <p:nvPr/>
+        </p:nvPicPr>
+        <p:blipFill>
+          <a:blip r:embed="rId2">
+            <a:extLst>
+              <a:ext uri="{28A0092B-C50C-407E-A947-70E740481C1C}">
+                <a14:useLocalDpi xmlns:a14="http://schemas.microsoft.com/office/drawing/2010/main" val="0"/>
+              </a:ext>
+            </a:extLst>
+          </a:blip>
+          <a:srcRect/>
+          <a:stretch>
+            <a:fillRect/>
+          </a:stretch>
+        </p:blipFill>
+        <p:spPr bwMode="auto">
+          <a:xfrm>
+            <a:off x="155575" y="-585788"/>
+            <a:ext cx="11277600" cy="1704976"/>
+          </a:xfrm>
+          <a:prstGeom prst="rect">
+            <a:avLst/>
+          </a:prstGeom>
+          <a:noFill/>
+          <a:extLst>
+            <a:ext uri="{909E8E84-426E-40DD-AFC4-6F175D3DCCD1}">
+              <a14:hiddenFill xmlns:a14="http://schemas.microsoft.com/office/drawing/2010/main">
+                <a:solidFill>
+                  <a:srgbClr val="FFFFFF"/>
+                </a:solidFill>
+              </a14:hiddenFill>
+            </a:ext>
+          </a:extLst>
+        </p:spPr>
+      </p:pic>
+    </p:spTree>
+    <p:extLst>
+      <p:ext uri="{BB962C8B-B14F-4D97-AF65-F5344CB8AC3E}">
+        <p14:creationId xmlns:p14="http://schemas.microsoft.com/office/powerpoint/2010/main" val="3952860920"/>
+      </p:ext>
+    </p:extLst>
+  </p:cSld>
+  <p:clrMapOvr>
+    <a:masterClrMapping/>
+  </p:clrMapOvr>
+  <p:transition>
+    <p:strips dir="rd"/>
+  </p:transition>
+</p:sld>
+</file>
+
+<file path=ppt/slides/slide6.xml><?xml version="1.0" encoding="utf-8"?>
+<p:sld xmlns:a="http://schemas.openxmlformats.org/drawingml/2006/main" xmlns:r="http://schemas.openxmlformats.org/officeDocument/2006/relationships" xmlns:p="http://schemas.openxmlformats.org/presentationml/2006/main">
+  <p:cSld>
+    <p:spTree>
+      <p:nvGrpSpPr>
+        <p:cNvPr id="1" name=""/>
+        <p:cNvGrpSpPr/>
+        <p:nvPr/>
+      </p:nvGrpSpPr>
+      <p:grpSpPr>
+        <a:xfrm>
+          <a:off x="0" y="0"/>
+          <a:ext cx="0" cy="0"/>
+          <a:chOff x="0" y="0"/>
+          <a:chExt cx="0" cy="0"/>
+        </a:xfrm>
+      </p:grpSpPr>
+      <p:sp>
+        <p:nvSpPr>
           <p:cNvPr id="4" name="Rectangle 3"/>
           <p:cNvSpPr/>
           <p:nvPr/>
@@ -17187,146 +17491,6 @@
 </p:sld>
 </file>
 
-<file path=ppt/slides/slide6.xml><?xml version="1.0" encoding="utf-8"?>
-<p:sld xmlns:a="http://schemas.openxmlformats.org/drawingml/2006/main" xmlns:r="http://schemas.openxmlformats.org/officeDocument/2006/relationships" xmlns:p="http://schemas.openxmlformats.org/presentationml/2006/main">
-  <p:cSld>
-    <p:spTree>
-      <p:nvGrpSpPr>
-        <p:cNvPr id="1" name=""/>
-        <p:cNvGrpSpPr/>
-        <p:nvPr/>
-      </p:nvGrpSpPr>
-      <p:grpSpPr>
-        <a:xfrm>
-          <a:off x="0" y="0"/>
-          <a:ext cx="0" cy="0"/>
-          <a:chOff x="0" y="0"/>
-          <a:chExt cx="0" cy="0"/>
-        </a:xfrm>
-      </p:grpSpPr>
-      <p:sp>
-        <p:nvSpPr>
-          <p:cNvPr id="2" name="Title 1"/>
-          <p:cNvSpPr>
-            <a:spLocks noGrp="1"/>
-          </p:cNvSpPr>
-          <p:nvPr>
-            <p:ph type="title"/>
-          </p:nvPr>
-        </p:nvSpPr>
-        <p:spPr/>
-        <p:txBody>
-          <a:bodyPr/>
-          <a:lstStyle/>
-          <a:p>
-            <a:r>
-              <a:rPr lang="en-US" dirty="0" smtClean="0"/>
-              <a:t>Filter Order</a:t>
-            </a:r>
-            <a:endParaRPr lang="en-US" dirty="0"/>
-          </a:p>
-        </p:txBody>
-      </p:sp>
-      <p:sp>
-        <p:nvSpPr>
-          <p:cNvPr id="4" name="Content Placeholder 3"/>
-          <p:cNvSpPr>
-            <a:spLocks noGrp="1"/>
-          </p:cNvSpPr>
-          <p:nvPr>
-            <p:ph idx="1"/>
-          </p:nvPr>
-        </p:nvSpPr>
-        <p:spPr>
-          <a:xfrm>
-            <a:off x="304800" y="1416050"/>
-            <a:ext cx="8655050" cy="3656386"/>
-          </a:xfrm>
-        </p:spPr>
-        <p:txBody>
-          <a:bodyPr/>
-          <a:lstStyle/>
-          <a:p>
-            <a:r>
-              <a:rPr lang="en-US" dirty="0"/>
-              <a:t>Filters run in the following order:</a:t>
-            </a:r>
-          </a:p>
-          <a:p>
-            <a:pPr lvl="1">
-              <a:lnSpc>
-                <a:spcPct val="150000"/>
-              </a:lnSpc>
-            </a:pPr>
-            <a:r>
-              <a:rPr lang="en-US" sz="2400" dirty="0"/>
-              <a:t>Authorization filters</a:t>
-            </a:r>
-          </a:p>
-          <a:p>
-            <a:pPr lvl="1">
-              <a:lnSpc>
-                <a:spcPct val="150000"/>
-              </a:lnSpc>
-            </a:pPr>
-            <a:r>
-              <a:rPr lang="en-US" sz="2400" dirty="0"/>
-              <a:t>Action filters</a:t>
-            </a:r>
-          </a:p>
-          <a:p>
-            <a:pPr lvl="1">
-              <a:lnSpc>
-                <a:spcPct val="150000"/>
-              </a:lnSpc>
-            </a:pPr>
-            <a:r>
-              <a:rPr lang="en-US" sz="2400" dirty="0"/>
-              <a:t>Response filters</a:t>
-            </a:r>
-          </a:p>
-          <a:p>
-            <a:pPr lvl="1">
-              <a:lnSpc>
-                <a:spcPct val="150000"/>
-              </a:lnSpc>
-            </a:pPr>
-            <a:r>
-              <a:rPr lang="en-US" sz="2400" dirty="0"/>
-              <a:t>Exception filters</a:t>
-            </a:r>
-          </a:p>
-          <a:p>
-            <a:pPr marL="0" indent="0">
-              <a:buNone/>
-            </a:pPr>
-            <a:endParaRPr lang="en-US" dirty="0"/>
-          </a:p>
-        </p:txBody>
-      </p:sp>
-    </p:spTree>
-    <p:extLst>
-      <p:ext uri="{BB962C8B-B14F-4D97-AF65-F5344CB8AC3E}">
-        <p14:creationId xmlns:p14="http://schemas.microsoft.com/office/powerpoint/2010/main" val="2763044001"/>
-      </p:ext>
-    </p:extLst>
-  </p:cSld>
-  <p:clrMapOvr>
-    <a:masterClrMapping/>
-  </p:clrMapOvr>
-  <p:transition>
-    <p:strips dir="rd"/>
-  </p:transition>
-  <p:timing>
-    <p:tnLst>
-      <p:par>
-        <p:cTn id="1" dur="indefinite" restart="never" nodeType="tmRoot"/>
-      </p:par>
-    </p:tnLst>
-  </p:timing>
-</p:sld>
-</file>
-
 <file path=ppt/slides/slide7.xml><?xml version="1.0" encoding="utf-8"?>
 <p:sld xmlns:a="http://schemas.openxmlformats.org/drawingml/2006/main" xmlns:r="http://schemas.openxmlformats.org/officeDocument/2006/relationships" xmlns:p="http://schemas.openxmlformats.org/presentationml/2006/main">
   <p:cSld>
@@ -17361,6 +17525,146 @@
           <a:p>
             <a:r>
               <a:rPr lang="en-US" dirty="0" smtClean="0"/>
+              <a:t>Filter Order</a:t>
+            </a:r>
+            <a:endParaRPr lang="en-US" dirty="0"/>
+          </a:p>
+        </p:txBody>
+      </p:sp>
+      <p:sp>
+        <p:nvSpPr>
+          <p:cNvPr id="4" name="Content Placeholder 3"/>
+          <p:cNvSpPr>
+            <a:spLocks noGrp="1"/>
+          </p:cNvSpPr>
+          <p:nvPr>
+            <p:ph idx="1"/>
+          </p:nvPr>
+        </p:nvSpPr>
+        <p:spPr>
+          <a:xfrm>
+            <a:off x="304800" y="1416050"/>
+            <a:ext cx="8655050" cy="3656386"/>
+          </a:xfrm>
+        </p:spPr>
+        <p:txBody>
+          <a:bodyPr/>
+          <a:lstStyle/>
+          <a:p>
+            <a:r>
+              <a:rPr lang="en-US" dirty="0"/>
+              <a:t>Filters run in the following order:</a:t>
+            </a:r>
+          </a:p>
+          <a:p>
+            <a:pPr lvl="1">
+              <a:lnSpc>
+                <a:spcPct val="150000"/>
+              </a:lnSpc>
+            </a:pPr>
+            <a:r>
+              <a:rPr lang="en-US" sz="2400" dirty="0"/>
+              <a:t>Authorization filters</a:t>
+            </a:r>
+          </a:p>
+          <a:p>
+            <a:pPr lvl="1">
+              <a:lnSpc>
+                <a:spcPct val="150000"/>
+              </a:lnSpc>
+            </a:pPr>
+            <a:r>
+              <a:rPr lang="en-US" sz="2400" dirty="0"/>
+              <a:t>Action filters</a:t>
+            </a:r>
+          </a:p>
+          <a:p>
+            <a:pPr lvl="1">
+              <a:lnSpc>
+                <a:spcPct val="150000"/>
+              </a:lnSpc>
+            </a:pPr>
+            <a:r>
+              <a:rPr lang="en-US" sz="2400" dirty="0"/>
+              <a:t>Response filters</a:t>
+            </a:r>
+          </a:p>
+          <a:p>
+            <a:pPr lvl="1">
+              <a:lnSpc>
+                <a:spcPct val="150000"/>
+              </a:lnSpc>
+            </a:pPr>
+            <a:r>
+              <a:rPr lang="en-US" sz="2400" dirty="0"/>
+              <a:t>Exception filters</a:t>
+            </a:r>
+          </a:p>
+          <a:p>
+            <a:pPr marL="0" indent="0">
+              <a:buNone/>
+            </a:pPr>
+            <a:endParaRPr lang="en-US" dirty="0"/>
+          </a:p>
+        </p:txBody>
+      </p:sp>
+    </p:spTree>
+    <p:extLst>
+      <p:ext uri="{BB962C8B-B14F-4D97-AF65-F5344CB8AC3E}">
+        <p14:creationId xmlns:p14="http://schemas.microsoft.com/office/powerpoint/2010/main" val="2763044001"/>
+      </p:ext>
+    </p:extLst>
+  </p:cSld>
+  <p:clrMapOvr>
+    <a:masterClrMapping/>
+  </p:clrMapOvr>
+  <p:transition>
+    <p:strips dir="rd"/>
+  </p:transition>
+  <p:timing>
+    <p:tnLst>
+      <p:par>
+        <p:cTn id="1" dur="indefinite" restart="never" nodeType="tmRoot"/>
+      </p:par>
+    </p:tnLst>
+  </p:timing>
+</p:sld>
+</file>
+
+<file path=ppt/slides/slide8.xml><?xml version="1.0" encoding="utf-8"?>
+<p:sld xmlns:a="http://schemas.openxmlformats.org/drawingml/2006/main" xmlns:r="http://schemas.openxmlformats.org/officeDocument/2006/relationships" xmlns:p="http://schemas.openxmlformats.org/presentationml/2006/main">
+  <p:cSld>
+    <p:spTree>
+      <p:nvGrpSpPr>
+        <p:cNvPr id="1" name=""/>
+        <p:cNvGrpSpPr/>
+        <p:nvPr/>
+      </p:nvGrpSpPr>
+      <p:grpSpPr>
+        <a:xfrm>
+          <a:off x="0" y="0"/>
+          <a:ext cx="0" cy="0"/>
+          <a:chOff x="0" y="0"/>
+          <a:chExt cx="0" cy="0"/>
+        </a:xfrm>
+      </p:grpSpPr>
+      <p:sp>
+        <p:nvSpPr>
+          <p:cNvPr id="2" name="Title 1"/>
+          <p:cNvSpPr>
+            <a:spLocks noGrp="1"/>
+          </p:cNvSpPr>
+          <p:nvPr>
+            <p:ph type="title"/>
+          </p:nvPr>
+        </p:nvSpPr>
+        <p:spPr/>
+        <p:txBody>
+          <a:bodyPr/>
+          <a:lstStyle/>
+          <a:p>
+            <a:r>
+              <a:rPr lang="en-US" dirty="0" smtClean="0"/>
               <a:t>Controller &amp; Filters</a:t>
             </a:r>
             <a:endParaRPr lang="en-US" dirty="0"/>
@@ -17523,7 +17827,7 @@
 </p:sld>
 </file>
 
-<file path=ppt/slides/slide8.xml><?xml version="1.0" encoding="utf-8"?>
+<file path=ppt/slides/slide9.xml><?xml version="1.0" encoding="utf-8"?>
 <p:sld xmlns:a="http://schemas.openxmlformats.org/drawingml/2006/main" xmlns:r="http://schemas.openxmlformats.org/officeDocument/2006/relationships" xmlns:p="http://schemas.openxmlformats.org/presentationml/2006/main">
   <p:cSld>
     <p:spTree>
@@ -17688,196 +17992,6 @@
     <p:extLst>
       <p:ext uri="{BB962C8B-B14F-4D97-AF65-F5344CB8AC3E}">
         <p14:creationId xmlns:p14="http://schemas.microsoft.com/office/powerpoint/2010/main" val="1650877713"/>
-      </p:ext>
-    </p:extLst>
-  </p:cSld>
-  <p:clrMapOvr>
-    <a:masterClrMapping/>
-  </p:clrMapOvr>
-  <p:transition>
-    <p:strips dir="rd"/>
-  </p:transition>
-  <p:timing>
-    <p:tnLst>
-      <p:par>
-        <p:cTn id="1" dur="indefinite" restart="never" nodeType="tmRoot"/>
-      </p:par>
-    </p:tnLst>
-  </p:timing>
-</p:sld>
-</file>
-
-<file path=ppt/slides/slide9.xml><?xml version="1.0" encoding="utf-8"?>
-<p:sld xmlns:a="http://schemas.openxmlformats.org/drawingml/2006/main" xmlns:r="http://schemas.openxmlformats.org/officeDocument/2006/relationships" xmlns:p="http://schemas.openxmlformats.org/presentationml/2006/main">
-  <p:cSld>
-    <p:spTree>
-      <p:nvGrpSpPr>
-        <p:cNvPr id="1" name=""/>
-        <p:cNvGrpSpPr/>
-        <p:nvPr/>
-      </p:nvGrpSpPr>
-      <p:grpSpPr>
-        <a:xfrm>
-          <a:off x="0" y="0"/>
-          <a:ext cx="0" cy="0"/>
-          <a:chOff x="0" y="0"/>
-          <a:chExt cx="0" cy="0"/>
-        </a:xfrm>
-      </p:grpSpPr>
-      <p:sp>
-        <p:nvSpPr>
-          <p:cNvPr id="2" name="Title 1"/>
-          <p:cNvSpPr>
-            <a:spLocks noGrp="1"/>
-          </p:cNvSpPr>
-          <p:nvPr>
-            <p:ph type="title"/>
-          </p:nvPr>
-        </p:nvSpPr>
-        <p:spPr/>
-        <p:txBody>
-          <a:bodyPr/>
-          <a:lstStyle/>
-          <a:p>
-            <a:r>
-              <a:rPr lang="en-US" dirty="0"/>
-              <a:t> </a:t>
-            </a:r>
-            <a:r>
-              <a:rPr lang="en-US" dirty="0" err="1"/>
-              <a:t>IAuthorizationFilter</a:t>
-            </a:r>
-            <a:endParaRPr lang="en-US" dirty="0"/>
-          </a:p>
-        </p:txBody>
-      </p:sp>
-      <p:sp>
-        <p:nvSpPr>
-          <p:cNvPr id="3" name="Content Placeholder 2"/>
-          <p:cNvSpPr>
-            <a:spLocks noGrp="1"/>
-          </p:cNvSpPr>
-          <p:nvPr>
-            <p:ph idx="1"/>
-          </p:nvPr>
-        </p:nvSpPr>
-        <p:spPr>
-          <a:xfrm>
-            <a:off x="304800" y="1416050"/>
-            <a:ext cx="8655050" cy="3010055"/>
-          </a:xfrm>
-        </p:spPr>
-        <p:txBody>
-          <a:bodyPr/>
-          <a:lstStyle/>
-          <a:p>
-            <a:r>
-              <a:rPr lang="en-US" dirty="0" smtClean="0"/>
-              <a:t>Make </a:t>
-            </a:r>
-            <a:r>
-              <a:rPr lang="en-US" dirty="0"/>
-              <a:t>security decisions about whether to execute an action </a:t>
-            </a:r>
-            <a:r>
-              <a:rPr lang="en-US" dirty="0" smtClean="0"/>
-              <a:t>method.</a:t>
-            </a:r>
-          </a:p>
-          <a:p>
-            <a:pPr lvl="1">
-              <a:lnSpc>
-                <a:spcPct val="150000"/>
-              </a:lnSpc>
-            </a:pPr>
-            <a:r>
-              <a:rPr lang="en-US" dirty="0" err="1" smtClean="0"/>
-              <a:t>AuthorizeAttribute</a:t>
-            </a:r>
-            <a:endParaRPr lang="en-US" dirty="0"/>
-          </a:p>
-          <a:p>
-            <a:pPr lvl="1">
-              <a:lnSpc>
-                <a:spcPct val="150000"/>
-              </a:lnSpc>
-            </a:pPr>
-            <a:r>
-              <a:rPr lang="en-US" dirty="0" err="1" smtClean="0"/>
-              <a:t>RequireHttpsAttribute</a:t>
-            </a:r>
-            <a:endParaRPr lang="en-US" dirty="0"/>
-          </a:p>
-          <a:p>
-            <a:endParaRPr lang="en-US" dirty="0"/>
-          </a:p>
-          <a:p>
-            <a:endParaRPr lang="en-US" dirty="0"/>
-          </a:p>
-        </p:txBody>
-      </p:sp>
-      <p:pic>
-        <p:nvPicPr>
-          <p:cNvPr id="3074" name="Picture 2"/>
-          <p:cNvPicPr>
-            <a:picLocks noChangeAspect="1" noChangeArrowheads="1"/>
-          </p:cNvPicPr>
-          <p:nvPr/>
-        </p:nvPicPr>
-        <p:blipFill>
-          <a:blip r:embed="rId2">
-            <a:extLst>
-              <a:ext uri="{28A0092B-C50C-407E-A947-70E740481C1C}">
-                <a14:useLocalDpi xmlns:a14="http://schemas.microsoft.com/office/drawing/2010/main" val="0"/>
-              </a:ext>
-            </a:extLst>
-          </a:blip>
-          <a:srcRect/>
-          <a:stretch>
-            <a:fillRect/>
-          </a:stretch>
-        </p:blipFill>
-        <p:spPr bwMode="auto">
-          <a:xfrm>
-            <a:off x="1750695" y="3718560"/>
-            <a:ext cx="5637774" cy="1855470"/>
-          </a:xfrm>
-          <a:prstGeom prst="roundRect">
-            <a:avLst>
-              <a:gd name="adj" fmla="val 8594"/>
-            </a:avLst>
-          </a:prstGeom>
-          <a:solidFill>
-            <a:srgbClr val="FFFFFF">
-              <a:shade val="85000"/>
-            </a:srgbClr>
-          </a:solidFill>
-          <a:ln>
-            <a:noFill/>
-          </a:ln>
-          <a:effectLst>
-            <a:outerShdw dist="35921" dir="2700000" sx="1000" sy="1000" algn="ctr" rotWithShape="0">
-              <a:schemeClr val="bg2"/>
-            </a:outerShdw>
-          </a:effectLst>
-          <a:extLst>
-            <a:ext uri="{91240B29-F687-4F45-9708-019B960494DF}">
-              <a14:hiddenLine xmlns:a14="http://schemas.microsoft.com/office/drawing/2010/main" w="9525">
-                <a:solidFill>
-                  <a:schemeClr val="tx1"/>
-                </a:solidFill>
-                <a:miter lim="800000"/>
-                <a:headEnd/>
-                <a:tailEnd/>
-              </a14:hiddenLine>
-            </a:ext>
-          </a:extLst>
-        </p:spPr>
-      </p:pic>
-    </p:spTree>
-    <p:extLst>
-      <p:ext uri="{BB962C8B-B14F-4D97-AF65-F5344CB8AC3E}">
-        <p14:creationId xmlns:p14="http://schemas.microsoft.com/office/powerpoint/2010/main" val="549084641"/>
       </p:ext>
     </p:extLst>
   </p:cSld>

</xml_diff>